<commit_message>
added to kb chapter
</commit_message>
<xml_diff>
--- a/5_dissertation/presentation/figures.pptx
+++ b/5_dissertation/presentation/figures.pptx
@@ -3415,6 +3415,58 @@
       </p:grpSpPr>
       <p:sp>
         <p:nvSpPr>
+          <p:cNvPr id="22" name="Rectangle 21">
+            <a:extLst>
+              <a:ext uri="{FF2B5EF4-FFF2-40B4-BE49-F238E27FC236}">
+                <a16:creationId xmlns:a16="http://schemas.microsoft.com/office/drawing/2014/main" id="{98E8B181-C9CD-B948-BE91-0D4C2E89B29B}"/>
+              </a:ext>
+            </a:extLst>
+          </p:cNvPr>
+          <p:cNvSpPr/>
+          <p:nvPr/>
+        </p:nvSpPr>
+        <p:spPr>
+          <a:xfrm>
+            <a:off x="1705515" y="1009246"/>
+            <a:ext cx="7686885" cy="4966445"/>
+          </a:xfrm>
+          <a:prstGeom prst="rect">
+            <a:avLst/>
+          </a:prstGeom>
+          <a:solidFill>
+            <a:schemeClr val="bg1"/>
+          </a:solidFill>
+          <a:ln>
+            <a:noFill/>
+          </a:ln>
+        </p:spPr>
+        <p:style>
+          <a:lnRef idx="2">
+            <a:schemeClr val="accent1">
+              <a:shade val="50000"/>
+            </a:schemeClr>
+          </a:lnRef>
+          <a:fillRef idx="1">
+            <a:schemeClr val="accent1"/>
+          </a:fillRef>
+          <a:effectRef idx="0">
+            <a:schemeClr val="accent1"/>
+          </a:effectRef>
+          <a:fontRef idx="minor">
+            <a:schemeClr val="lt1"/>
+          </a:fontRef>
+        </p:style>
+        <p:txBody>
+          <a:bodyPr rtlCol="0" anchor="ctr"/>
+          <a:lstStyle/>
+          <a:p>
+            <a:pPr algn="ctr"/>
+            <a:endParaRPr lang="en-US"/>
+          </a:p>
+        </p:txBody>
+      </p:sp>
+      <p:sp>
+        <p:nvSpPr>
           <p:cNvPr id="5" name="TextBox 4">
             <a:extLst>
               <a:ext uri="{FF2B5EF4-FFF2-40B4-BE49-F238E27FC236}">
@@ -3427,7 +3479,7 @@
         </p:nvSpPr>
         <p:spPr>
           <a:xfrm>
-            <a:off x="134167" y="2928038"/>
+            <a:off x="1705515" y="2954671"/>
             <a:ext cx="3256588" cy="1323439"/>
           </a:xfrm>
           <a:prstGeom prst="rect">
@@ -3479,7 +3531,7 @@
         </p:nvGrpSpPr>
         <p:grpSpPr>
           <a:xfrm>
-            <a:off x="3976451" y="1072258"/>
+            <a:off x="5547799" y="1098891"/>
             <a:ext cx="3907945" cy="4876800"/>
             <a:chOff x="5795468" y="941294"/>
             <a:chExt cx="3830300" cy="4876800"/>
@@ -4225,7 +4277,7 @@
         </p:nvSpPr>
         <p:spPr>
           <a:xfrm>
-            <a:off x="3273202" y="3221966"/>
+            <a:off x="4844550" y="3248599"/>
             <a:ext cx="365185" cy="414068"/>
           </a:xfrm>
           <a:prstGeom prst="rightArrow">
@@ -4263,779 +4315,6 @@
           </a:p>
         </p:txBody>
       </p:sp>
-      <p:grpSp>
-        <p:nvGrpSpPr>
-          <p:cNvPr id="21" name="Group 20">
-            <a:extLst>
-              <a:ext uri="{FF2B5EF4-FFF2-40B4-BE49-F238E27FC236}">
-                <a16:creationId xmlns:a16="http://schemas.microsoft.com/office/drawing/2014/main" id="{BB1AF79B-CBAB-52C3-8BC4-A555C6EA06AD}"/>
-              </a:ext>
-            </a:extLst>
-          </p:cNvPr>
-          <p:cNvGrpSpPr/>
-          <p:nvPr/>
-        </p:nvGrpSpPr>
-        <p:grpSpPr>
-          <a:xfrm>
-            <a:off x="8004833" y="773605"/>
-            <a:ext cx="3907945" cy="5175453"/>
-            <a:chOff x="2260676" y="1117537"/>
-            <a:chExt cx="3907945" cy="5175453"/>
-          </a:xfrm>
-        </p:grpSpPr>
-        <p:grpSp>
-          <p:nvGrpSpPr>
-            <p:cNvPr id="10" name="Group 9">
-              <a:extLst>
-                <a:ext uri="{FF2B5EF4-FFF2-40B4-BE49-F238E27FC236}">
-                  <a16:creationId xmlns:a16="http://schemas.microsoft.com/office/drawing/2014/main" id="{FFCD65A7-BD08-1FD4-E030-5D0C50A6F6C0}"/>
-                </a:ext>
-              </a:extLst>
-            </p:cNvPr>
-            <p:cNvGrpSpPr/>
-            <p:nvPr/>
-          </p:nvGrpSpPr>
-          <p:grpSpPr>
-            <a:xfrm>
-              <a:off x="2260676" y="1416190"/>
-              <a:ext cx="3907945" cy="4876800"/>
-              <a:chOff x="5795468" y="941294"/>
-              <a:chExt cx="3830300" cy="4876800"/>
-            </a:xfrm>
-          </p:grpSpPr>
-          <p:sp>
-            <p:nvSpPr>
-              <p:cNvPr id="11" name="Rounded Rectangle 10">
-                <a:extLst>
-                  <a:ext uri="{FF2B5EF4-FFF2-40B4-BE49-F238E27FC236}">
-                    <a16:creationId xmlns:a16="http://schemas.microsoft.com/office/drawing/2014/main" id="{E8B7AB27-36BD-380B-D6DA-9EE298A027D6}"/>
-                  </a:ext>
-                </a:extLst>
-              </p:cNvPr>
-              <p:cNvSpPr/>
-              <p:nvPr/>
-            </p:nvSpPr>
-            <p:spPr>
-              <a:xfrm>
-                <a:off x="5795468" y="941294"/>
-                <a:ext cx="3768215" cy="4876800"/>
-              </a:xfrm>
-              <a:prstGeom prst="roundRect">
-                <a:avLst/>
-              </a:prstGeom>
-              <a:solidFill>
-                <a:srgbClr val="E3E8F7">
-                  <a:alpha val="32941"/>
-                </a:srgbClr>
-              </a:solidFill>
-              <a:ln>
-                <a:noFill/>
-              </a:ln>
-            </p:spPr>
-            <p:style>
-              <a:lnRef idx="2">
-                <a:schemeClr val="accent1">
-                  <a:shade val="50000"/>
-                </a:schemeClr>
-              </a:lnRef>
-              <a:fillRef idx="1">
-                <a:schemeClr val="accent1"/>
-              </a:fillRef>
-              <a:effectRef idx="0">
-                <a:schemeClr val="accent1"/>
-              </a:effectRef>
-              <a:fontRef idx="minor">
-                <a:schemeClr val="lt1"/>
-              </a:fontRef>
-            </p:style>
-            <p:txBody>
-              <a:bodyPr rtlCol="0" anchor="ctr"/>
-              <a:lstStyle/>
-              <a:p>
-                <a:pPr algn="ctr"/>
-                <a:endParaRPr lang="en-US"/>
-              </a:p>
-            </p:txBody>
-          </p:sp>
-          <p:sp>
-            <p:nvSpPr>
-              <p:cNvPr id="12" name="TextBox 11">
-                <a:extLst>
-                  <a:ext uri="{FF2B5EF4-FFF2-40B4-BE49-F238E27FC236}">
-                    <a16:creationId xmlns:a16="http://schemas.microsoft.com/office/drawing/2014/main" id="{F01EEEDD-D7CF-A051-34AF-E5BD4A836CDF}"/>
-                  </a:ext>
-                </a:extLst>
-              </p:cNvPr>
-              <p:cNvSpPr txBox="1"/>
-              <p:nvPr/>
-            </p:nvSpPr>
-            <p:spPr>
-              <a:xfrm>
-                <a:off x="5975598" y="1166842"/>
-                <a:ext cx="3650170" cy="4524315"/>
-              </a:xfrm>
-              <a:prstGeom prst="rect">
-                <a:avLst/>
-              </a:prstGeom>
-              <a:noFill/>
-            </p:spPr>
-            <p:txBody>
-              <a:bodyPr wrap="square" rtlCol="0">
-                <a:spAutoFit/>
-              </a:bodyPr>
-              <a:lstStyle/>
-              <a:p>
-                <a:r>
-                  <a:rPr lang="en-US" dirty="0">
-                    <a:solidFill>
-                      <a:schemeClr val="bg1">
-                        <a:lumMod val="85000"/>
-                      </a:schemeClr>
-                    </a:solidFill>
-                    <a:latin typeface="Consolas" panose="020B0609020204030204" pitchFamily="49" charset="0"/>
-                    <a:cs typeface="Consolas" panose="020B0609020204030204" pitchFamily="49" charset="0"/>
-                  </a:rPr>
-                  <a:t>intersect(</a:t>
-                </a:r>
-              </a:p>
-              <a:p>
-                <a:r>
-                  <a:rPr lang="en-US" dirty="0">
-                    <a:solidFill>
-                      <a:schemeClr val="bg1">
-                        <a:lumMod val="85000"/>
-                      </a:schemeClr>
-                    </a:solidFill>
-                    <a:latin typeface="Consolas" panose="020B0609020204030204" pitchFamily="49" charset="0"/>
-                    <a:cs typeface="Consolas" panose="020B0609020204030204" pitchFamily="49" charset="0"/>
-                  </a:rPr>
-                  <a:t>  cond(“Diabetic”),</a:t>
-                </a:r>
-              </a:p>
-              <a:p>
-                <a:r>
-                  <a:rPr lang="en-US" dirty="0">
-                    <a:solidFill>
-                      <a:schemeClr val="bg1">
-                        <a:lumMod val="85000"/>
-                      </a:schemeClr>
-                    </a:solidFill>
-                    <a:latin typeface="Consolas" panose="020B0609020204030204" pitchFamily="49" charset="0"/>
-                    <a:cs typeface="Consolas" panose="020B0609020204030204" pitchFamily="49" charset="0"/>
-                  </a:rPr>
-                  <a:t>  union(</a:t>
-                </a:r>
-              </a:p>
-              <a:p>
-                <a:r>
-                  <a:rPr lang="en-US" dirty="0">
-                    <a:solidFill>
-                      <a:schemeClr val="bg1">
-                        <a:lumMod val="85000"/>
-                      </a:schemeClr>
-                    </a:solidFill>
-                    <a:latin typeface="Consolas" panose="020B0609020204030204" pitchFamily="49" charset="0"/>
-                    <a:cs typeface="Consolas" panose="020B0609020204030204" pitchFamily="49" charset="0"/>
-                  </a:rPr>
-                  <a:t>    female(),</a:t>
-                </a:r>
-              </a:p>
-              <a:p>
-                <a:r>
-                  <a:rPr lang="en-US" dirty="0">
-                    <a:solidFill>
-                      <a:schemeClr val="bg1">
-                        <a:lumMod val="85000"/>
-                      </a:schemeClr>
-                    </a:solidFill>
-                    <a:latin typeface="Consolas" panose="020B0609020204030204" pitchFamily="49" charset="0"/>
-                    <a:cs typeface="Consolas" panose="020B0609020204030204" pitchFamily="49" charset="0"/>
-                  </a:rPr>
-                  <a:t>    male()</a:t>
-                </a:r>
-              </a:p>
-              <a:p>
-                <a:r>
-                  <a:rPr lang="en-US" dirty="0">
-                    <a:solidFill>
-                      <a:schemeClr val="bg1">
-                        <a:lumMod val="85000"/>
-                      </a:schemeClr>
-                    </a:solidFill>
-                    <a:latin typeface="Consolas" panose="020B0609020204030204" pitchFamily="49" charset="0"/>
-                    <a:cs typeface="Consolas" panose="020B0609020204030204" pitchFamily="49" charset="0"/>
-                  </a:rPr>
-                  <a:t>  ),</a:t>
-                </a:r>
-              </a:p>
-              <a:p>
-                <a:r>
-                  <a:rPr lang="en-US" dirty="0">
-                    <a:solidFill>
-                      <a:schemeClr val="bg1">
-                        <a:lumMod val="85000"/>
-                      </a:schemeClr>
-                    </a:solidFill>
-                    <a:latin typeface="Consolas" panose="020B0609020204030204" pitchFamily="49" charset="0"/>
-                    <a:cs typeface="Consolas" panose="020B0609020204030204" pitchFamily="49" charset="0"/>
-                  </a:rPr>
-                  <a:t>  age()</a:t>
-                </a:r>
-              </a:p>
-              <a:p>
-                <a:r>
-                  <a:rPr lang="en-US" dirty="0">
-                    <a:solidFill>
-                      <a:schemeClr val="bg1">
-                        <a:lumMod val="85000"/>
-                      </a:schemeClr>
-                    </a:solidFill>
-                    <a:latin typeface="Consolas" panose="020B0609020204030204" pitchFamily="49" charset="0"/>
-                    <a:cs typeface="Consolas" panose="020B0609020204030204" pitchFamily="49" charset="0"/>
-                  </a:rPr>
-                  <a:t>    .</a:t>
-                </a:r>
-                <a:r>
-                  <a:rPr lang="en-US" dirty="0" err="1">
-                    <a:solidFill>
-                      <a:schemeClr val="bg1">
-                        <a:lumMod val="85000"/>
-                      </a:schemeClr>
-                    </a:solidFill>
-                    <a:latin typeface="Consolas" panose="020B0609020204030204" pitchFamily="49" charset="0"/>
-                    <a:cs typeface="Consolas" panose="020B0609020204030204" pitchFamily="49" charset="0"/>
-                  </a:rPr>
-                  <a:t>num_filter</a:t>
-                </a:r>
-                <a:r>
-                  <a:rPr lang="en-US" dirty="0">
-                    <a:solidFill>
-                      <a:schemeClr val="bg1">
-                        <a:lumMod val="85000"/>
-                      </a:schemeClr>
-                    </a:solidFill>
-                    <a:latin typeface="Consolas" panose="020B0609020204030204" pitchFamily="49" charset="0"/>
-                    <a:cs typeface="Consolas" panose="020B0609020204030204" pitchFamily="49" charset="0"/>
-                  </a:rPr>
-                  <a:t>(</a:t>
-                </a:r>
-              </a:p>
-              <a:p>
-                <a:r>
-                  <a:rPr lang="en-US" dirty="0">
-                    <a:solidFill>
-                      <a:schemeClr val="bg1">
-                        <a:lumMod val="85000"/>
-                      </a:schemeClr>
-                    </a:solidFill>
-                    <a:latin typeface="Consolas" panose="020B0609020204030204" pitchFamily="49" charset="0"/>
-                    <a:cs typeface="Consolas" panose="020B0609020204030204" pitchFamily="49" charset="0"/>
-                  </a:rPr>
-                  <a:t>      eq(op(GT), val(“65”))</a:t>
-                </a:r>
-              </a:p>
-              <a:p>
-                <a:r>
-                  <a:rPr lang="en-US" dirty="0">
-                    <a:solidFill>
-                      <a:schemeClr val="bg1">
-                        <a:lumMod val="85000"/>
-                      </a:schemeClr>
-                    </a:solidFill>
-                    <a:latin typeface="Consolas" panose="020B0609020204030204" pitchFamily="49" charset="0"/>
-                    <a:cs typeface="Consolas" panose="020B0609020204030204" pitchFamily="49" charset="0"/>
-                  </a:rPr>
-                  <a:t>    ),</a:t>
-                </a:r>
-              </a:p>
-              <a:p>
-                <a:r>
-                  <a:rPr lang="en-US" dirty="0">
-                    <a:solidFill>
-                      <a:schemeClr val="bg1">
-                        <a:lumMod val="85000"/>
-                      </a:schemeClr>
-                    </a:solidFill>
-                    <a:latin typeface="Consolas" panose="020B0609020204030204" pitchFamily="49" charset="0"/>
-                    <a:cs typeface="Consolas" panose="020B0609020204030204" pitchFamily="49" charset="0"/>
-                  </a:rPr>
-                  <a:t>  neg(</a:t>
-                </a:r>
-              </a:p>
-              <a:p>
-                <a:r>
-                  <a:rPr lang="en-US" dirty="0">
-                    <a:solidFill>
-                      <a:schemeClr val="bg1">
-                        <a:lumMod val="85000"/>
-                      </a:schemeClr>
-                    </a:solidFill>
-                    <a:latin typeface="Consolas" panose="020B0609020204030204" pitchFamily="49" charset="0"/>
-                    <a:cs typeface="Consolas" panose="020B0609020204030204" pitchFamily="49" charset="0"/>
-                  </a:rPr>
-                  <a:t>    contraindication(</a:t>
-                </a:r>
-              </a:p>
-              <a:p>
-                <a:r>
-                  <a:rPr lang="en-US" dirty="0">
-                    <a:solidFill>
-                      <a:schemeClr val="bg1">
-                        <a:lumMod val="85000"/>
-                      </a:schemeClr>
-                    </a:solidFill>
-                    <a:latin typeface="Consolas" panose="020B0609020204030204" pitchFamily="49" charset="0"/>
-                    <a:cs typeface="Consolas" panose="020B0609020204030204" pitchFamily="49" charset="0"/>
-                  </a:rPr>
-                  <a:t>      drug(“metformin”)</a:t>
-                </a:r>
-              </a:p>
-              <a:p>
-                <a:r>
-                  <a:rPr lang="en-US" dirty="0">
-                    <a:solidFill>
-                      <a:schemeClr val="bg1">
-                        <a:lumMod val="85000"/>
-                      </a:schemeClr>
-                    </a:solidFill>
-                    <a:latin typeface="Consolas" panose="020B0609020204030204" pitchFamily="49" charset="0"/>
-                    <a:cs typeface="Consolas" panose="020B0609020204030204" pitchFamily="49" charset="0"/>
-                  </a:rPr>
-                  <a:t>    )</a:t>
-                </a:r>
-              </a:p>
-              <a:p>
-                <a:r>
-                  <a:rPr lang="en-US" dirty="0">
-                    <a:solidFill>
-                      <a:schemeClr val="bg1">
-                        <a:lumMod val="85000"/>
-                      </a:schemeClr>
-                    </a:solidFill>
-                    <a:latin typeface="Consolas" panose="020B0609020204030204" pitchFamily="49" charset="0"/>
-                    <a:cs typeface="Consolas" panose="020B0609020204030204" pitchFamily="49" charset="0"/>
-                  </a:rPr>
-                  <a:t>  )</a:t>
-                </a:r>
-              </a:p>
-              <a:p>
-                <a:r>
-                  <a:rPr lang="en-US" dirty="0">
-                    <a:solidFill>
-                      <a:schemeClr val="bg1">
-                        <a:lumMod val="85000"/>
-                      </a:schemeClr>
-                    </a:solidFill>
-                    <a:latin typeface="Consolas" panose="020B0609020204030204" pitchFamily="49" charset="0"/>
-                    <a:cs typeface="Consolas" panose="020B0609020204030204" pitchFamily="49" charset="0"/>
-                  </a:rPr>
-                  <a:t>)</a:t>
-                </a:r>
-              </a:p>
-            </p:txBody>
-          </p:sp>
-        </p:grpSp>
-        <p:cxnSp>
-          <p:nvCxnSpPr>
-            <p:cNvPr id="13" name="Straight Connector 12">
-              <a:extLst>
-                <a:ext uri="{FF2B5EF4-FFF2-40B4-BE49-F238E27FC236}">
-                  <a16:creationId xmlns:a16="http://schemas.microsoft.com/office/drawing/2014/main" id="{63DE21FA-FECC-E4C0-B5D5-ABB6423AE1BD}"/>
-                </a:ext>
-              </a:extLst>
-            </p:cNvPr>
-            <p:cNvCxnSpPr>
-              <a:cxnSpLocks/>
-            </p:cNvCxnSpPr>
-            <p:nvPr/>
-          </p:nvCxnSpPr>
-          <p:spPr>
-            <a:xfrm>
-              <a:off x="2522834" y="1707294"/>
-              <a:ext cx="0" cy="4342174"/>
-            </a:xfrm>
-            <a:prstGeom prst="line">
-              <a:avLst/>
-            </a:prstGeom>
-            <a:ln w="28575">
-              <a:solidFill>
-                <a:schemeClr val="accent5"/>
-              </a:solidFill>
-            </a:ln>
-          </p:spPr>
-          <p:style>
-            <a:lnRef idx="1">
-              <a:schemeClr val="accent1"/>
-            </a:lnRef>
-            <a:fillRef idx="0">
-              <a:schemeClr val="accent1"/>
-            </a:fillRef>
-            <a:effectRef idx="0">
-              <a:schemeClr val="accent1"/>
-            </a:effectRef>
-            <a:fontRef idx="minor">
-              <a:schemeClr val="tx1"/>
-            </a:fontRef>
-          </p:style>
-        </p:cxnSp>
-        <p:cxnSp>
-          <p:nvCxnSpPr>
-            <p:cNvPr id="14" name="Straight Connector 13">
-              <a:extLst>
-                <a:ext uri="{FF2B5EF4-FFF2-40B4-BE49-F238E27FC236}">
-                  <a16:creationId xmlns:a16="http://schemas.microsoft.com/office/drawing/2014/main" id="{7C370CEB-B709-9ACE-3BCB-465C982AA05D}"/>
-                </a:ext>
-              </a:extLst>
-            </p:cNvPr>
-            <p:cNvCxnSpPr>
-              <a:cxnSpLocks/>
-            </p:cNvCxnSpPr>
-            <p:nvPr/>
-          </p:nvCxnSpPr>
-          <p:spPr>
-            <a:xfrm>
-              <a:off x="2762320" y="2053530"/>
-              <a:ext cx="0" cy="3778110"/>
-            </a:xfrm>
-            <a:prstGeom prst="line">
-              <a:avLst/>
-            </a:prstGeom>
-            <a:ln w="28575">
-              <a:solidFill>
-                <a:srgbClr val="7030A0"/>
-              </a:solidFill>
-            </a:ln>
-          </p:spPr>
-          <p:style>
-            <a:lnRef idx="1">
-              <a:schemeClr val="accent1"/>
-            </a:lnRef>
-            <a:fillRef idx="0">
-              <a:schemeClr val="accent1"/>
-            </a:fillRef>
-            <a:effectRef idx="0">
-              <a:schemeClr val="accent1"/>
-            </a:effectRef>
-            <a:fontRef idx="minor">
-              <a:schemeClr val="tx1"/>
-            </a:fontRef>
-          </p:style>
-        </p:cxnSp>
-        <p:cxnSp>
-          <p:nvCxnSpPr>
-            <p:cNvPr id="15" name="Straight Connector 14">
-              <a:extLst>
-                <a:ext uri="{FF2B5EF4-FFF2-40B4-BE49-F238E27FC236}">
-                  <a16:creationId xmlns:a16="http://schemas.microsoft.com/office/drawing/2014/main" id="{BAC32307-87DD-BE35-432C-067DD62345FC}"/>
-                </a:ext>
-              </a:extLst>
-            </p:cNvPr>
-            <p:cNvCxnSpPr>
-              <a:cxnSpLocks/>
-            </p:cNvCxnSpPr>
-            <p:nvPr/>
-          </p:nvCxnSpPr>
-          <p:spPr>
-            <a:xfrm>
-              <a:off x="2993098" y="2481848"/>
-              <a:ext cx="0" cy="549148"/>
-            </a:xfrm>
-            <a:prstGeom prst="line">
-              <a:avLst/>
-            </a:prstGeom>
-            <a:ln w="28575">
-              <a:solidFill>
-                <a:schemeClr val="accent2"/>
-              </a:solidFill>
-            </a:ln>
-          </p:spPr>
-          <p:style>
-            <a:lnRef idx="1">
-              <a:schemeClr val="accent1"/>
-            </a:lnRef>
-            <a:fillRef idx="0">
-              <a:schemeClr val="accent1"/>
-            </a:fillRef>
-            <a:effectRef idx="0">
-              <a:schemeClr val="accent1"/>
-            </a:effectRef>
-            <a:fontRef idx="minor">
-              <a:schemeClr val="tx1"/>
-            </a:fontRef>
-          </p:style>
-        </p:cxnSp>
-        <p:cxnSp>
-          <p:nvCxnSpPr>
-            <p:cNvPr id="16" name="Straight Connector 15">
-              <a:extLst>
-                <a:ext uri="{FF2B5EF4-FFF2-40B4-BE49-F238E27FC236}">
-                  <a16:creationId xmlns:a16="http://schemas.microsoft.com/office/drawing/2014/main" id="{928661E1-8E68-54E5-39B7-2BBF1E7BB600}"/>
-                </a:ext>
-              </a:extLst>
-            </p:cNvPr>
-            <p:cNvCxnSpPr>
-              <a:cxnSpLocks/>
-            </p:cNvCxnSpPr>
-            <p:nvPr/>
-          </p:nvCxnSpPr>
-          <p:spPr>
-            <a:xfrm>
-              <a:off x="2993098" y="3675469"/>
-              <a:ext cx="0" cy="748406"/>
-            </a:xfrm>
-            <a:prstGeom prst="line">
-              <a:avLst/>
-            </a:prstGeom>
-            <a:ln w="28575">
-              <a:solidFill>
-                <a:schemeClr val="accent2"/>
-              </a:solidFill>
-            </a:ln>
-          </p:spPr>
-          <p:style>
-            <a:lnRef idx="1">
-              <a:schemeClr val="accent1"/>
-            </a:lnRef>
-            <a:fillRef idx="0">
-              <a:schemeClr val="accent1"/>
-            </a:fillRef>
-            <a:effectRef idx="0">
-              <a:schemeClr val="accent1"/>
-            </a:effectRef>
-            <a:fontRef idx="minor">
-              <a:schemeClr val="tx1"/>
-            </a:fontRef>
-          </p:style>
-        </p:cxnSp>
-        <p:cxnSp>
-          <p:nvCxnSpPr>
-            <p:cNvPr id="17" name="Straight Connector 16">
-              <a:extLst>
-                <a:ext uri="{FF2B5EF4-FFF2-40B4-BE49-F238E27FC236}">
-                  <a16:creationId xmlns:a16="http://schemas.microsoft.com/office/drawing/2014/main" id="{A7ED75E9-85DA-E673-064E-512FE6716228}"/>
-                </a:ext>
-              </a:extLst>
-            </p:cNvPr>
-            <p:cNvCxnSpPr>
-              <a:cxnSpLocks/>
-            </p:cNvCxnSpPr>
-            <p:nvPr/>
-          </p:nvCxnSpPr>
-          <p:spPr>
-            <a:xfrm>
-              <a:off x="2993098" y="4808077"/>
-              <a:ext cx="0" cy="748406"/>
-            </a:xfrm>
-            <a:prstGeom prst="line">
-              <a:avLst/>
-            </a:prstGeom>
-            <a:ln w="28575">
-              <a:solidFill>
-                <a:schemeClr val="accent2"/>
-              </a:solidFill>
-            </a:ln>
-          </p:spPr>
-          <p:style>
-            <a:lnRef idx="1">
-              <a:schemeClr val="accent1"/>
-            </a:lnRef>
-            <a:fillRef idx="0">
-              <a:schemeClr val="accent1"/>
-            </a:fillRef>
-            <a:effectRef idx="0">
-              <a:schemeClr val="accent1"/>
-            </a:effectRef>
-            <a:fontRef idx="minor">
-              <a:schemeClr val="tx1"/>
-            </a:fontRef>
-          </p:style>
-        </p:cxnSp>
-        <p:cxnSp>
-          <p:nvCxnSpPr>
-            <p:cNvPr id="18" name="Straight Connector 17">
-              <a:extLst>
-                <a:ext uri="{FF2B5EF4-FFF2-40B4-BE49-F238E27FC236}">
-                  <a16:creationId xmlns:a16="http://schemas.microsoft.com/office/drawing/2014/main" id="{13657859-5CCC-D976-F3A1-88701A38D60D}"/>
-                </a:ext>
-              </a:extLst>
-            </p:cNvPr>
-            <p:cNvCxnSpPr>
-              <a:cxnSpLocks/>
-            </p:cNvCxnSpPr>
-            <p:nvPr/>
-          </p:nvCxnSpPr>
-          <p:spPr>
-            <a:xfrm>
-              <a:off x="3250001" y="3915449"/>
-              <a:ext cx="0" cy="309168"/>
-            </a:xfrm>
-            <a:prstGeom prst="line">
-              <a:avLst/>
-            </a:prstGeom>
-            <a:ln w="28575">
-              <a:solidFill>
-                <a:schemeClr val="accent6"/>
-              </a:solidFill>
-            </a:ln>
-          </p:spPr>
-          <p:style>
-            <a:lnRef idx="1">
-              <a:schemeClr val="accent1"/>
-            </a:lnRef>
-            <a:fillRef idx="0">
-              <a:schemeClr val="accent1"/>
-            </a:fillRef>
-            <a:effectRef idx="0">
-              <a:schemeClr val="accent1"/>
-            </a:effectRef>
-            <a:fontRef idx="minor">
-              <a:schemeClr val="tx1"/>
-            </a:fontRef>
-          </p:style>
-        </p:cxnSp>
-        <p:cxnSp>
-          <p:nvCxnSpPr>
-            <p:cNvPr id="19" name="Straight Connector 18">
-              <a:extLst>
-                <a:ext uri="{FF2B5EF4-FFF2-40B4-BE49-F238E27FC236}">
-                  <a16:creationId xmlns:a16="http://schemas.microsoft.com/office/drawing/2014/main" id="{7775A79D-15F7-D1C0-E6D1-EAF5145B99C3}"/>
-                </a:ext>
-              </a:extLst>
-            </p:cNvPr>
-            <p:cNvCxnSpPr>
-              <a:cxnSpLocks/>
-            </p:cNvCxnSpPr>
-            <p:nvPr/>
-          </p:nvCxnSpPr>
-          <p:spPr>
-            <a:xfrm>
-              <a:off x="3250001" y="4999666"/>
-              <a:ext cx="0" cy="309168"/>
-            </a:xfrm>
-            <a:prstGeom prst="line">
-              <a:avLst/>
-            </a:prstGeom>
-            <a:ln w="28575">
-              <a:solidFill>
-                <a:schemeClr val="accent6"/>
-              </a:solidFill>
-            </a:ln>
-          </p:spPr>
-          <p:style>
-            <a:lnRef idx="1">
-              <a:schemeClr val="accent1"/>
-            </a:lnRef>
-            <a:fillRef idx="0">
-              <a:schemeClr val="accent1"/>
-            </a:fillRef>
-            <a:effectRef idx="0">
-              <a:schemeClr val="accent1"/>
-            </a:effectRef>
-            <a:fontRef idx="minor">
-              <a:schemeClr val="tx1"/>
-            </a:fontRef>
-          </p:style>
-        </p:cxnSp>
-        <p:sp>
-          <p:nvSpPr>
-            <p:cNvPr id="20" name="TextBox 19">
-              <a:extLst>
-                <a:ext uri="{FF2B5EF4-FFF2-40B4-BE49-F238E27FC236}">
-                  <a16:creationId xmlns:a16="http://schemas.microsoft.com/office/drawing/2014/main" id="{F57CECE5-B1B0-DAA4-C13E-34BFEC0C8244}"/>
-                </a:ext>
-              </a:extLst>
-            </p:cNvPr>
-            <p:cNvSpPr txBox="1"/>
-            <p:nvPr/>
-          </p:nvSpPr>
-          <p:spPr>
-            <a:xfrm>
-              <a:off x="2371991" y="1117537"/>
-              <a:ext cx="1090363" cy="369332"/>
-            </a:xfrm>
-            <a:prstGeom prst="rect">
-              <a:avLst/>
-            </a:prstGeom>
-            <a:noFill/>
-          </p:spPr>
-          <p:txBody>
-            <a:bodyPr wrap="none" rtlCol="0">
-              <a:spAutoFit/>
-            </a:bodyPr>
-            <a:lstStyle/>
-            <a:p>
-              <a:r>
-                <a:rPr lang="en-US" dirty="0">
-                  <a:solidFill>
-                    <a:schemeClr val="accent5"/>
-                  </a:solidFill>
-                  <a:latin typeface="Roboto Light" panose="02000000000000000000" pitchFamily="2" charset="0"/>
-                  <a:ea typeface="Roboto Light" panose="02000000000000000000" pitchFamily="2" charset="0"/>
-                </a:rPr>
-                <a:t>1</a:t>
-              </a:r>
-              <a:r>
-                <a:rPr lang="en-US" dirty="0">
-                  <a:latin typeface="Roboto Light" panose="02000000000000000000" pitchFamily="2" charset="0"/>
-                  <a:ea typeface="Roboto Light" panose="02000000000000000000" pitchFamily="2" charset="0"/>
-                </a:rPr>
-                <a:t>  </a:t>
-              </a:r>
-              <a:r>
-                <a:rPr lang="en-US" dirty="0">
-                  <a:solidFill>
-                    <a:srgbClr val="7030A0"/>
-                  </a:solidFill>
-                  <a:latin typeface="Roboto Light" panose="02000000000000000000" pitchFamily="2" charset="0"/>
-                  <a:ea typeface="Roboto Light" panose="02000000000000000000" pitchFamily="2" charset="0"/>
-                </a:rPr>
-                <a:t>2</a:t>
-              </a:r>
-              <a:r>
-                <a:rPr lang="en-US" dirty="0">
-                  <a:latin typeface="Roboto Light" panose="02000000000000000000" pitchFamily="2" charset="0"/>
-                  <a:ea typeface="Roboto Light" panose="02000000000000000000" pitchFamily="2" charset="0"/>
-                </a:rPr>
-                <a:t>  </a:t>
-              </a:r>
-              <a:r>
-                <a:rPr lang="en-US" dirty="0">
-                  <a:solidFill>
-                    <a:schemeClr val="accent2"/>
-                  </a:solidFill>
-                  <a:latin typeface="Roboto Light" panose="02000000000000000000" pitchFamily="2" charset="0"/>
-                  <a:ea typeface="Roboto Light" panose="02000000000000000000" pitchFamily="2" charset="0"/>
-                </a:rPr>
-                <a:t>3</a:t>
-              </a:r>
-              <a:r>
-                <a:rPr lang="en-US" dirty="0">
-                  <a:latin typeface="Roboto Light" panose="02000000000000000000" pitchFamily="2" charset="0"/>
-                  <a:ea typeface="Roboto Light" panose="02000000000000000000" pitchFamily="2" charset="0"/>
-                </a:rPr>
-                <a:t>  </a:t>
-              </a:r>
-              <a:r>
-                <a:rPr lang="en-US" dirty="0">
-                  <a:solidFill>
-                    <a:schemeClr val="accent6"/>
-                  </a:solidFill>
-                  <a:latin typeface="Roboto Light" panose="02000000000000000000" pitchFamily="2" charset="0"/>
-                  <a:ea typeface="Roboto Light" panose="02000000000000000000" pitchFamily="2" charset="0"/>
-                </a:rPr>
-                <a:t>4</a:t>
-              </a:r>
-              <a:r>
-                <a:rPr lang="en-US" dirty="0">
-                  <a:latin typeface="Roboto Light" panose="02000000000000000000" pitchFamily="2" charset="0"/>
-                  <a:ea typeface="Roboto Light" panose="02000000000000000000" pitchFamily="2" charset="0"/>
-                </a:rPr>
-                <a:t> </a:t>
-              </a:r>
-            </a:p>
-          </p:txBody>
-        </p:sp>
-      </p:grpSp>
     </p:spTree>
     <p:extLst>
       <p:ext uri="{BB962C8B-B14F-4D97-AF65-F5344CB8AC3E}">
@@ -5163,7 +4442,7 @@
         </p:blipFill>
         <p:spPr>
           <a:xfrm>
-            <a:off x="1931504" y="113493"/>
+            <a:off x="1931504" y="0"/>
             <a:ext cx="7772400" cy="3092682"/>
           </a:xfrm>
           <a:prstGeom prst="rect">
@@ -5193,7 +4472,7 @@
         </p:blipFill>
         <p:spPr>
           <a:xfrm>
-            <a:off x="1931504" y="3206175"/>
+            <a:off x="1931504" y="3092682"/>
             <a:ext cx="7772400" cy="4325752"/>
           </a:xfrm>
           <a:prstGeom prst="rect">

</xml_diff>